<commit_message>
Changed out species diagram with one that uses the same font as the genus diagram.
</commit_message>
<xml_diff>
--- a/Fungi/Fig1_actual.pptx
+++ b/Fungi/Fig1_actual.pptx
@@ -109,7 +109,7 @@
   </p:defaultTextStyle>
   <p:extLst>
     <p:ext uri="{EFAFB233-063F-42B5-8137-9DF3F51BA10A}">
-      <p15:sldGuideLst xmlns:p15="http://schemas.microsoft.com/office/powerpoint/2012/main" xmlns=""/>
+      <p15:sldGuideLst xmlns="" xmlns:p15="http://schemas.microsoft.com/office/powerpoint/2012/main"/>
     </p:ext>
   </p:extLst>
 </p:presentation>
@@ -3386,7 +3386,7 @@
       </p:grpSpPr>
       <p:pic>
         <p:nvPicPr>
-          <p:cNvPr id="1026" name="Picture 2" descr="C:\Users\Caitlin Loeffler\Desktop\SPECIES_Distribution.png"/>
+          <p:cNvPr id="2" name="Picture 2" descr="C:\Users\Caitlin Loeffler\Desktop\SPECIES_Distribution_match_font.png"/>
           <p:cNvPicPr>
             <a:picLocks noChangeAspect="1" noChangeArrowheads="1"/>
           </p:cNvPicPr>
@@ -3407,8 +3407,8 @@
         </p:blipFill>
         <p:spPr bwMode="auto">
           <a:xfrm>
-            <a:off x="4122071" y="301195"/>
-            <a:ext cx="3357624" cy="3424907"/>
+            <a:off x="4122181" y="230814"/>
+            <a:ext cx="3357404" cy="3401568"/>
           </a:xfrm>
           <a:prstGeom prst="rect">
             <a:avLst/>
@@ -3488,7 +3488,7 @@
           <p:cNvPr id="12" name="Picture 11">
             <a:extLst>
               <a:ext uri="{FF2B5EF4-FFF2-40B4-BE49-F238E27FC236}">
-                <a16:creationId xmlns:a16="http://schemas.microsoft.com/office/drawing/2014/main" xmlns="" id="{1768FC5F-476A-7345-842F-6028B654BAC0}"/>
+                <a16:creationId xmlns="" xmlns:a16="http://schemas.microsoft.com/office/drawing/2014/main" id="{1768FC5F-476A-7345-842F-6028B654BAC0}"/>
               </a:ext>
             </a:extLst>
           </p:cNvPr>
@@ -3559,7 +3559,7 @@
           <p:cNvPr id="20" name="Picture 19">
             <a:extLst>
               <a:ext uri="{FF2B5EF4-FFF2-40B4-BE49-F238E27FC236}">
-                <a16:creationId xmlns:a16="http://schemas.microsoft.com/office/drawing/2014/main" xmlns="" id="{BB900F9E-24FE-F143-AE19-CBB39C3C0514}"/>
+                <a16:creationId xmlns="" xmlns:a16="http://schemas.microsoft.com/office/drawing/2014/main" id="{BB900F9E-24FE-F143-AE19-CBB39C3C0514}"/>
               </a:ext>
             </a:extLst>
           </p:cNvPr>
@@ -3618,7 +3618,7 @@
           <p:cNvPr id="28" name="TextBox 27">
             <a:extLst>
               <a:ext uri="{FF2B5EF4-FFF2-40B4-BE49-F238E27FC236}">
-                <a16:creationId xmlns:a16="http://schemas.microsoft.com/office/drawing/2014/main" xmlns="" id="{7BF06C5A-7A22-C04C-BEAE-E517816FBBE5}"/>
+                <a16:creationId xmlns="" xmlns:a16="http://schemas.microsoft.com/office/drawing/2014/main" id="{7BF06C5A-7A22-C04C-BEAE-E517816FBBE5}"/>
               </a:ext>
             </a:extLst>
           </p:cNvPr>
@@ -3653,7 +3653,7 @@
           <p:cNvPr id="29" name="TextBox 28">
             <a:extLst>
               <a:ext uri="{FF2B5EF4-FFF2-40B4-BE49-F238E27FC236}">
-                <a16:creationId xmlns:a16="http://schemas.microsoft.com/office/drawing/2014/main" xmlns="" id="{2DA85F8E-8C33-584A-A2EC-2B6488EBF2CC}"/>
+                <a16:creationId xmlns="" xmlns:a16="http://schemas.microsoft.com/office/drawing/2014/main" id="{2DA85F8E-8C33-584A-A2EC-2B6488EBF2CC}"/>
               </a:ext>
             </a:extLst>
           </p:cNvPr>
@@ -3688,7 +3688,7 @@
           <p:cNvPr id="24" name="Picture 23">
             <a:extLst>
               <a:ext uri="{FF2B5EF4-FFF2-40B4-BE49-F238E27FC236}">
-                <a16:creationId xmlns:a16="http://schemas.microsoft.com/office/drawing/2014/main" xmlns="" id="{A1BC8856-7A9D-3342-8B71-9591AECBC3A7}"/>
+                <a16:creationId xmlns="" xmlns:a16="http://schemas.microsoft.com/office/drawing/2014/main" id="{A1BC8856-7A9D-3342-8B71-9591AECBC3A7}"/>
               </a:ext>
             </a:extLst>
           </p:cNvPr>
@@ -3851,6 +3851,13 @@
   <p:clrMapOvr>
     <a:masterClrMapping/>
   </p:clrMapOvr>
+  <p:timing>
+    <p:tnLst>
+      <p:par>
+        <p:cTn id="1" dur="indefinite" restart="never" nodeType="tmRoot"/>
+      </p:par>
+    </p:tnLst>
+  </p:timing>
 </p:sld>
 </file>
 
@@ -4109,7 +4116,7 @@
   <a:extraClrSchemeLst/>
   <a:extLst>
     <a:ext uri="{05A4C25C-085E-4340-85A3-A5531E510DB2}">
-      <thm15:themeFamily xmlns:thm15="http://schemas.microsoft.com/office/thememl/2012/main" xmlns="" name="Office Theme" id="{62F939B6-93AF-4DB8-9C6B-D6C7DFDC589F}" vid="{4A3C46E8-61CC-4603-A589-7422A47A8E4A}"/>
+      <thm15:themeFamily xmlns="" xmlns:thm15="http://schemas.microsoft.com/office/thememl/2012/main" name="Office Theme" id="{62F939B6-93AF-4DB8-9C6B-D6C7DFDC589F}" vid="{4A3C46E8-61CC-4603-A589-7422A47A8E4A}"/>
     </a:ext>
   </a:extLst>
 </a:theme>
@@ -4370,7 +4377,7 @@
   <a:extraClrSchemeLst/>
   <a:extLst>
     <a:ext uri="{05A4C25C-085E-4340-85A3-A5531E510DB2}">
-      <thm15:themeFamily xmlns:thm15="http://schemas.microsoft.com/office/thememl/2012/main" xmlns="" name="Office Theme" id="{62F939B6-93AF-4DB8-9C6B-D6C7DFDC589F}" vid="{4A3C46E8-61CC-4603-A589-7422A47A8E4A}"/>
+      <thm15:themeFamily xmlns="" xmlns:thm15="http://schemas.microsoft.com/office/thememl/2012/main" name="Office Theme" id="{62F939B6-93AF-4DB8-9C6B-D6C7DFDC589F}" vid="{4A3C46E8-61CC-4603-A589-7422A47A8E4A}"/>
     </a:ext>
   </a:extLst>
 </a:theme>

</xml_diff>